<commit_message>
Now with more Shader manager!
</commit_message>
<xml_diff>
--- a/Lectures/Day_02 (Thursday, May 9th, 2024)/Day_02_On_screen_Notes.pptx
+++ b/Lectures/Day_02 (Thursday, May 9th, 2024)/Day_02_On_screen_Notes.pptx
@@ -5,15 +5,16 @@
     <p:sldMasterId id="2147483648" r:id="rId1"/>
   </p:sldMasterIdLst>
   <p:notesMasterIdLst>
-    <p:notesMasterId r:id="rId8"/>
+    <p:notesMasterId r:id="rId9"/>
   </p:notesMasterIdLst>
   <p:sldIdLst>
     <p:sldId id="323" r:id="rId2"/>
     <p:sldId id="326" r:id="rId3"/>
     <p:sldId id="334" r:id="rId4"/>
     <p:sldId id="335" r:id="rId5"/>
-    <p:sldId id="327" r:id="rId6"/>
-    <p:sldId id="325" r:id="rId7"/>
+    <p:sldId id="336" r:id="rId6"/>
+    <p:sldId id="327" r:id="rId7"/>
+    <p:sldId id="325" r:id="rId8"/>
   </p:sldIdLst>
   <p:sldSz cx="9144000" cy="5143500" type="screen16x9"/>
   <p:notesSz cx="6858000" cy="9144000"/>
@@ -286,7 +287,7 @@
               <a:pPr>
                 <a:defRPr/>
               </a:pPr>
-              <a:t>5/9/2024</a:t>
+              <a:t>5/14/2024</a:t>
             </a:fld>
             <a:endParaRPr lang="en-US"/>
           </a:p>
@@ -811,7 +812,7 @@
               <a:pPr>
                 <a:defRPr/>
               </a:pPr>
-              <a:t>5/9/2024</a:t>
+              <a:t>5/14/2024</a:t>
             </a:fld>
             <a:endParaRPr lang="en-US"/>
           </a:p>
@@ -935,7 +936,7 @@
               <a:pPr>
                 <a:defRPr/>
               </a:pPr>
-              <a:t>5/9/2024</a:t>
+              <a:t>5/14/2024</a:t>
             </a:fld>
             <a:endParaRPr lang="en-US" dirty="0"/>
           </a:p>
@@ -1125,7 +1126,7 @@
               <a:pPr>
                 <a:defRPr/>
               </a:pPr>
-              <a:t>5/9/2024</a:t>
+              <a:t>5/14/2024</a:t>
             </a:fld>
             <a:endParaRPr lang="en-US" dirty="0"/>
           </a:p>
@@ -1379,7 +1380,7 @@
               <a:pPr>
                 <a:defRPr/>
               </a:pPr>
-              <a:t>5/9/2024</a:t>
+              <a:t>5/14/2024</a:t>
             </a:fld>
             <a:endParaRPr lang="en-US"/>
           </a:p>
@@ -1685,7 +1686,7 @@
               <a:pPr>
                 <a:defRPr/>
               </a:pPr>
-              <a:t>5/9/2024</a:t>
+              <a:t>5/14/2024</a:t>
             </a:fld>
             <a:endParaRPr lang="en-US"/>
           </a:p>
@@ -2640,7 +2641,7 @@
               <a:pPr>
                 <a:defRPr/>
               </a:pPr>
-              <a:t>5/9/2024</a:t>
+              <a:t>5/14/2024</a:t>
             </a:fld>
             <a:endParaRPr lang="en-US"/>
           </a:p>
@@ -2792,7 +2793,7 @@
               <a:pPr>
                 <a:defRPr/>
               </a:pPr>
-              <a:t>5/9/2024</a:t>
+              <a:t>5/14/2024</a:t>
             </a:fld>
             <a:endParaRPr lang="en-US" dirty="0"/>
           </a:p>
@@ -2910,7 +2911,7 @@
               <a:pPr>
                 <a:defRPr/>
               </a:pPr>
-              <a:t>5/9/2024</a:t>
+              <a:t>5/14/2024</a:t>
             </a:fld>
             <a:endParaRPr lang="en-US"/>
           </a:p>
@@ -3188,7 +3189,7 @@
               <a:pPr>
                 <a:defRPr/>
               </a:pPr>
-              <a:t>5/9/2024</a:t>
+              <a:t>5/14/2024</a:t>
             </a:fld>
             <a:endParaRPr lang="en-US"/>
           </a:p>
@@ -3939,7 +3940,7 @@
               <a:pPr>
                 <a:defRPr/>
               </a:pPr>
-              <a:t>5/9/2024</a:t>
+              <a:t>5/14/2024</a:t>
             </a:fld>
             <a:endParaRPr lang="en-US"/>
           </a:p>
@@ -4189,7 +4190,7 @@
               <a:pPr>
                 <a:defRPr/>
               </a:pPr>
-              <a:t>5/9/2024</a:t>
+              <a:t>5/14/2024</a:t>
             </a:fld>
             <a:endParaRPr lang="en-US" dirty="0"/>
           </a:p>
@@ -5531,7 +5532,7 @@
         </p:nvSpPr>
         <p:spPr>
           <a:xfrm>
-            <a:off x="323528" y="1563638"/>
+            <a:off x="323528" y="1633002"/>
             <a:ext cx="2088232" cy="1008112"/>
           </a:xfrm>
           <a:prstGeom prst="roundRect">
@@ -5916,8 +5917,8 @@
         </p:nvSpPr>
         <p:spPr>
           <a:xfrm>
-            <a:off x="4857662" y="3011056"/>
-            <a:ext cx="792088" cy="404297"/>
+            <a:off x="4860032" y="2989425"/>
+            <a:ext cx="792088" cy="590437"/>
           </a:xfrm>
           <a:prstGeom prst="downArrow">
             <a:avLst/>
@@ -5945,6 +5946,88 @@
           <a:p>
             <a:pPr algn="ctr"/>
             <a:endParaRPr lang="en-CA"/>
+          </a:p>
+        </p:txBody>
+      </p:sp>
+      <p:sp>
+        <p:nvSpPr>
+          <p:cNvPr id="2" name="TextBox 1">
+            <a:extLst>
+              <a:ext uri="{FF2B5EF4-FFF2-40B4-BE49-F238E27FC236}">
+                <a16:creationId xmlns:a16="http://schemas.microsoft.com/office/drawing/2014/main" id="{2D69A090-1313-349D-23EA-B7538F77698B}"/>
+              </a:ext>
+            </a:extLst>
+          </p:cNvPr>
+          <p:cNvSpPr txBox="1"/>
+          <p:nvPr/>
+        </p:nvSpPr>
+        <p:spPr>
+          <a:xfrm>
+            <a:off x="4347504" y="3099486"/>
+            <a:ext cx="1925156" cy="369332"/>
+          </a:xfrm>
+          <a:prstGeom prst="rect">
+            <a:avLst/>
+          </a:prstGeom>
+          <a:noFill/>
+        </p:spPr>
+        <p:txBody>
+          <a:bodyPr wrap="square" rtlCol="0">
+            <a:spAutoFit/>
+          </a:bodyPr>
+          <a:lstStyle/>
+          <a:p>
+            <a:r>
+              <a:rPr lang="en-CA" sz="1800" dirty="0" err="1">
+                <a:solidFill>
+                  <a:srgbClr val="6F008A"/>
+                </a:solidFill>
+                <a:latin typeface="Cascadia Mono" panose="020B0609020000020004" pitchFamily="49" charset="0"/>
+              </a:rPr>
+              <a:t>glBufferData</a:t>
+            </a:r>
+            <a:endParaRPr lang="en-CA" dirty="0"/>
+          </a:p>
+        </p:txBody>
+      </p:sp>
+      <p:sp>
+        <p:nvSpPr>
+          <p:cNvPr id="3" name="TextBox 2">
+            <a:extLst>
+              <a:ext uri="{FF2B5EF4-FFF2-40B4-BE49-F238E27FC236}">
+                <a16:creationId xmlns:a16="http://schemas.microsoft.com/office/drawing/2014/main" id="{CE3C9054-F014-6F39-5195-CA352341CF34}"/>
+              </a:ext>
+            </a:extLst>
+          </p:cNvPr>
+          <p:cNvSpPr txBox="1"/>
+          <p:nvPr/>
+        </p:nvSpPr>
+        <p:spPr>
+          <a:xfrm>
+            <a:off x="4499992" y="906793"/>
+            <a:ext cx="1656184" cy="369332"/>
+          </a:xfrm>
+          <a:prstGeom prst="rect">
+            <a:avLst/>
+          </a:prstGeom>
+          <a:noFill/>
+        </p:spPr>
+        <p:txBody>
+          <a:bodyPr wrap="square" rtlCol="0">
+            <a:spAutoFit/>
+          </a:bodyPr>
+          <a:lstStyle/>
+          <a:p>
+            <a:r>
+              <a:rPr lang="en-CA" sz="1800" dirty="0" err="1">
+                <a:solidFill>
+                  <a:srgbClr val="6F008A"/>
+                </a:solidFill>
+                <a:latin typeface="Cascadia Mono" panose="020B0609020000020004" pitchFamily="49" charset="0"/>
+              </a:rPr>
+              <a:t>FileLoader</a:t>
+            </a:r>
+            <a:endParaRPr lang="en-CA" dirty="0"/>
           </a:p>
         </p:txBody>
       </p:sp>
@@ -6133,7 +6216,7 @@
         </p:nvSpPr>
         <p:spPr>
           <a:xfrm>
-            <a:off x="4092410" y="441731"/>
+            <a:off x="3976035" y="408346"/>
             <a:ext cx="3119420" cy="720080"/>
           </a:xfrm>
           <a:prstGeom prst="roundRect">
@@ -6327,7 +6410,7 @@
         </p:nvSpPr>
         <p:spPr>
           <a:xfrm>
-            <a:off x="3995936" y="3542223"/>
+            <a:off x="3923928" y="3554190"/>
             <a:ext cx="3119420" cy="720080"/>
           </a:xfrm>
           <a:prstGeom prst="roundRect">
@@ -6397,6 +6480,96 @@
           <a:chExt cx="0" cy="0"/>
         </a:xfrm>
       </p:grpSpPr>
+      <p:pic>
+        <p:nvPicPr>
+          <p:cNvPr id="5" name="Picture 4">
+            <a:extLst>
+              <a:ext uri="{FF2B5EF4-FFF2-40B4-BE49-F238E27FC236}">
+                <a16:creationId xmlns:a16="http://schemas.microsoft.com/office/drawing/2014/main" id="{C1D7F7EB-F382-72FD-7E40-F695B43C105E}"/>
+              </a:ext>
+            </a:extLst>
+          </p:cNvPr>
+          <p:cNvPicPr>
+            <a:picLocks noChangeAspect="1"/>
+          </p:cNvPicPr>
+          <p:nvPr/>
+        </p:nvPicPr>
+        <p:blipFill>
+          <a:blip r:embed="rId2"/>
+          <a:stretch>
+            <a:fillRect/>
+          </a:stretch>
+        </p:blipFill>
+        <p:spPr>
+          <a:xfrm>
+            <a:off x="683568" y="386113"/>
+            <a:ext cx="3024336" cy="2474884"/>
+          </a:xfrm>
+          <a:prstGeom prst="rect">
+            <a:avLst/>
+          </a:prstGeom>
+        </p:spPr>
+      </p:pic>
+      <p:pic>
+        <p:nvPicPr>
+          <p:cNvPr id="7" name="Picture 6">
+            <a:extLst>
+              <a:ext uri="{FF2B5EF4-FFF2-40B4-BE49-F238E27FC236}">
+                <a16:creationId xmlns:a16="http://schemas.microsoft.com/office/drawing/2014/main" id="{AF343BDB-47C8-6541-C95A-62A9BB984512}"/>
+              </a:ext>
+            </a:extLst>
+          </p:cNvPr>
+          <p:cNvPicPr>
+            <a:picLocks noChangeAspect="1"/>
+          </p:cNvPicPr>
+          <p:nvPr/>
+        </p:nvPicPr>
+        <p:blipFill>
+          <a:blip r:embed="rId3"/>
+          <a:stretch>
+            <a:fillRect/>
+          </a:stretch>
+        </p:blipFill>
+        <p:spPr>
+          <a:xfrm>
+            <a:off x="4716016" y="1419623"/>
+            <a:ext cx="3482243" cy="2849600"/>
+          </a:xfrm>
+          <a:prstGeom prst="rect">
+            <a:avLst/>
+          </a:prstGeom>
+        </p:spPr>
+      </p:pic>
+    </p:spTree>
+    <p:extLst>
+      <p:ext uri="{BB962C8B-B14F-4D97-AF65-F5344CB8AC3E}">
+        <p14:creationId xmlns:p14="http://schemas.microsoft.com/office/powerpoint/2010/main" val="3796979169"/>
+      </p:ext>
+    </p:extLst>
+  </p:cSld>
+  <p:clrMapOvr>
+    <a:masterClrMapping/>
+  </p:clrMapOvr>
+</p:sld>
+</file>
+
+<file path=ppt/slides/slide6.xml><?xml version="1.0" encoding="utf-8"?>
+<p:sld xmlns:a="http://schemas.openxmlformats.org/drawingml/2006/main" xmlns:r="http://schemas.openxmlformats.org/officeDocument/2006/relationships" xmlns:p="http://schemas.openxmlformats.org/presentationml/2006/main">
+  <p:cSld>
+    <p:spTree>
+      <p:nvGrpSpPr>
+        <p:cNvPr id="1" name=""/>
+        <p:cNvGrpSpPr/>
+        <p:nvPr/>
+      </p:nvGrpSpPr>
+      <p:grpSpPr>
+        <a:xfrm>
+          <a:off x="0" y="0"/>
+          <a:ext cx="0" cy="0"/>
+          <a:chOff x="0" y="0"/>
+          <a:chExt cx="0" cy="0"/>
+        </a:xfrm>
+      </p:grpSpPr>
       <p:sp>
         <p:nvSpPr>
           <p:cNvPr id="5" name="Rectangle: Rounded Corners 4">
@@ -6559,7 +6732,7 @@
 </p:sld>
 </file>
 
-<file path=ppt/slides/slide6.xml><?xml version="1.0" encoding="utf-8"?>
+<file path=ppt/slides/slide7.xml><?xml version="1.0" encoding="utf-8"?>
 <p:sld xmlns:a="http://schemas.openxmlformats.org/drawingml/2006/main" xmlns:r="http://schemas.openxmlformats.org/officeDocument/2006/relationships" xmlns:p="http://schemas.openxmlformats.org/presentationml/2006/main">
   <p:cSld>
     <p:spTree>

</xml_diff>

<commit_message>
We can load and display multiple models
</commit_message>
<xml_diff>
--- a/Lectures/Day_02 (Thursday, May 9th, 2024)/Day_02_On_screen_Notes.pptx
+++ b/Lectures/Day_02 (Thursday, May 9th, 2024)/Day_02_On_screen_Notes.pptx
@@ -5,7 +5,7 @@
     <p:sldMasterId id="2147483648" r:id="rId1"/>
   </p:sldMasterIdLst>
   <p:notesMasterIdLst>
-    <p:notesMasterId r:id="rId9"/>
+    <p:notesMasterId r:id="rId10"/>
   </p:notesMasterIdLst>
   <p:sldIdLst>
     <p:sldId id="323" r:id="rId2"/>
@@ -13,8 +13,9 @@
     <p:sldId id="334" r:id="rId4"/>
     <p:sldId id="335" r:id="rId5"/>
     <p:sldId id="336" r:id="rId6"/>
-    <p:sldId id="327" r:id="rId7"/>
-    <p:sldId id="325" r:id="rId8"/>
+    <p:sldId id="337" r:id="rId7"/>
+    <p:sldId id="327" r:id="rId8"/>
+    <p:sldId id="325" r:id="rId9"/>
   </p:sldIdLst>
   <p:sldSz cx="9144000" cy="5143500" type="screen16x9"/>
   <p:notesSz cx="6858000" cy="9144000"/>
@@ -6572,6 +6573,436 @@
       </p:grpSpPr>
       <p:sp>
         <p:nvSpPr>
+          <p:cNvPr id="4" name="Rectangle: Rounded Corners 3">
+            <a:extLst>
+              <a:ext uri="{FF2B5EF4-FFF2-40B4-BE49-F238E27FC236}">
+                <a16:creationId xmlns:a16="http://schemas.microsoft.com/office/drawing/2014/main" id="{02996688-1DB7-4024-684C-9C912F897838}"/>
+              </a:ext>
+            </a:extLst>
+          </p:cNvPr>
+          <p:cNvSpPr/>
+          <p:nvPr/>
+        </p:nvSpPr>
+        <p:spPr>
+          <a:xfrm>
+            <a:off x="274596" y="195486"/>
+            <a:ext cx="3240360" cy="4467660"/>
+          </a:xfrm>
+          <a:prstGeom prst="roundRect">
+            <a:avLst/>
+          </a:prstGeom>
+        </p:spPr>
+        <p:style>
+          <a:lnRef idx="3">
+            <a:schemeClr val="lt1"/>
+          </a:lnRef>
+          <a:fillRef idx="1">
+            <a:schemeClr val="accent4"/>
+          </a:fillRef>
+          <a:effectRef idx="1">
+            <a:schemeClr val="accent4"/>
+          </a:effectRef>
+          <a:fontRef idx="minor">
+            <a:schemeClr val="lt1"/>
+          </a:fontRef>
+        </p:style>
+        <p:txBody>
+          <a:bodyPr rtlCol="0" anchor="ctr"/>
+          <a:lstStyle/>
+          <a:p>
+            <a:pPr algn="ctr"/>
+            <a:r>
+              <a:rPr lang="en-CA" dirty="0" err="1"/>
+              <a:t>Cow.ply</a:t>
+            </a:r>
+            <a:endParaRPr lang="en-CA" dirty="0"/>
+          </a:p>
+          <a:p>
+            <a:pPr algn="ctr"/>
+            <a:endParaRPr lang="en-CA" dirty="0"/>
+          </a:p>
+          <a:p>
+            <a:pPr algn="ctr"/>
+            <a:endParaRPr lang="en-CA" dirty="0"/>
+          </a:p>
+          <a:p>
+            <a:pPr algn="ctr"/>
+            <a:endParaRPr lang="en-CA" dirty="0"/>
+          </a:p>
+          <a:p>
+            <a:pPr algn="ctr"/>
+            <a:endParaRPr lang="en-CA" dirty="0"/>
+          </a:p>
+          <a:p>
+            <a:pPr algn="ctr"/>
+            <a:endParaRPr lang="en-CA" dirty="0"/>
+          </a:p>
+          <a:p>
+            <a:pPr algn="ctr"/>
+            <a:endParaRPr lang="en-CA" dirty="0"/>
+          </a:p>
+          <a:p>
+            <a:pPr algn="ctr"/>
+            <a:endParaRPr lang="en-CA" dirty="0"/>
+          </a:p>
+          <a:p>
+            <a:pPr algn="ctr"/>
+            <a:endParaRPr lang="en-CA" dirty="0"/>
+          </a:p>
+          <a:p>
+            <a:pPr algn="ctr"/>
+            <a:endParaRPr lang="en-CA" dirty="0"/>
+          </a:p>
+          <a:p>
+            <a:pPr algn="ctr"/>
+            <a:endParaRPr lang="en-CA" dirty="0"/>
+          </a:p>
+          <a:p>
+            <a:pPr algn="ctr"/>
+            <a:endParaRPr lang="en-CA" dirty="0"/>
+          </a:p>
+        </p:txBody>
+      </p:sp>
+      <p:sp>
+        <p:nvSpPr>
+          <p:cNvPr id="8" name="Rectangle: Rounded Corners 7">
+            <a:extLst>
+              <a:ext uri="{FF2B5EF4-FFF2-40B4-BE49-F238E27FC236}">
+                <a16:creationId xmlns:a16="http://schemas.microsoft.com/office/drawing/2014/main" id="{79156AF4-6A88-4F5E-40FA-5BCC12B44F68}"/>
+              </a:ext>
+            </a:extLst>
+          </p:cNvPr>
+          <p:cNvSpPr/>
+          <p:nvPr/>
+        </p:nvSpPr>
+        <p:spPr>
+          <a:xfrm>
+            <a:off x="4818112" y="1599642"/>
+            <a:ext cx="3119420" cy="720080"/>
+          </a:xfrm>
+          <a:prstGeom prst="roundRect">
+            <a:avLst/>
+          </a:prstGeom>
+          <a:solidFill>
+            <a:schemeClr val="accent3"/>
+          </a:solidFill>
+          <a:ln>
+            <a:noFill/>
+          </a:ln>
+        </p:spPr>
+        <p:style>
+          <a:lnRef idx="0">
+            <a:scrgbClr r="0" g="0" b="0"/>
+          </a:lnRef>
+          <a:fillRef idx="0">
+            <a:scrgbClr r="0" g="0" b="0"/>
+          </a:fillRef>
+          <a:effectRef idx="0">
+            <a:scrgbClr r="0" g="0" b="0"/>
+          </a:effectRef>
+          <a:fontRef idx="minor">
+            <a:schemeClr val="lt1"/>
+          </a:fontRef>
+        </p:style>
+        <p:txBody>
+          <a:bodyPr rtlCol="0" anchor="ctr"/>
+          <a:lstStyle/>
+          <a:p>
+            <a:pPr algn="ctr"/>
+            <a:r>
+              <a:rPr lang="en-US" dirty="0"/>
+              <a:t>Vertex buffer</a:t>
+            </a:r>
+            <a:endParaRPr lang="en-CA" dirty="0"/>
+          </a:p>
+        </p:txBody>
+      </p:sp>
+      <p:sp>
+        <p:nvSpPr>
+          <p:cNvPr id="5" name="Rectangle: Rounded Corners 4">
+            <a:extLst>
+              <a:ext uri="{FF2B5EF4-FFF2-40B4-BE49-F238E27FC236}">
+                <a16:creationId xmlns:a16="http://schemas.microsoft.com/office/drawing/2014/main" id="{F8B6FD61-E267-CEA2-D4D9-BDEC4619AA69}"/>
+              </a:ext>
+            </a:extLst>
+          </p:cNvPr>
+          <p:cNvSpPr/>
+          <p:nvPr/>
+        </p:nvSpPr>
+        <p:spPr>
+          <a:xfrm>
+            <a:off x="539552" y="1571388"/>
+            <a:ext cx="2580750" cy="720080"/>
+          </a:xfrm>
+          <a:prstGeom prst="roundRect">
+            <a:avLst/>
+          </a:prstGeom>
+          <a:solidFill>
+            <a:schemeClr val="accent3"/>
+          </a:solidFill>
+          <a:ln>
+            <a:noFill/>
+          </a:ln>
+        </p:spPr>
+        <p:style>
+          <a:lnRef idx="0">
+            <a:scrgbClr r="0" g="0" b="0"/>
+          </a:lnRef>
+          <a:fillRef idx="0">
+            <a:scrgbClr r="0" g="0" b="0"/>
+          </a:fillRef>
+          <a:effectRef idx="0">
+            <a:scrgbClr r="0" g="0" b="0"/>
+          </a:effectRef>
+          <a:fontRef idx="minor">
+            <a:schemeClr val="lt1"/>
+          </a:fontRef>
+        </p:style>
+        <p:txBody>
+          <a:bodyPr rtlCol="0" anchor="ctr"/>
+          <a:lstStyle/>
+          <a:p>
+            <a:pPr algn="ctr"/>
+            <a:r>
+              <a:rPr lang="en-US" dirty="0"/>
+              <a:t>vertices</a:t>
+            </a:r>
+            <a:endParaRPr lang="en-CA" dirty="0"/>
+          </a:p>
+        </p:txBody>
+      </p:sp>
+      <p:sp>
+        <p:nvSpPr>
+          <p:cNvPr id="11" name="Rectangle: Rounded Corners 10">
+            <a:extLst>
+              <a:ext uri="{FF2B5EF4-FFF2-40B4-BE49-F238E27FC236}">
+                <a16:creationId xmlns:a16="http://schemas.microsoft.com/office/drawing/2014/main" id="{D340C04C-F838-C787-925B-DA32FAF1448B}"/>
+              </a:ext>
+            </a:extLst>
+          </p:cNvPr>
+          <p:cNvSpPr/>
+          <p:nvPr/>
+        </p:nvSpPr>
+        <p:spPr>
+          <a:xfrm>
+            <a:off x="539552" y="2429316"/>
+            <a:ext cx="2580750" cy="720080"/>
+          </a:xfrm>
+          <a:prstGeom prst="roundRect">
+            <a:avLst/>
+          </a:prstGeom>
+          <a:solidFill>
+            <a:schemeClr val="accent3"/>
+          </a:solidFill>
+          <a:ln>
+            <a:noFill/>
+          </a:ln>
+        </p:spPr>
+        <p:style>
+          <a:lnRef idx="0">
+            <a:scrgbClr r="0" g="0" b="0"/>
+          </a:lnRef>
+          <a:fillRef idx="0">
+            <a:scrgbClr r="0" g="0" b="0"/>
+          </a:fillRef>
+          <a:effectRef idx="0">
+            <a:scrgbClr r="0" g="0" b="0"/>
+          </a:effectRef>
+          <a:fontRef idx="minor">
+            <a:schemeClr val="lt1"/>
+          </a:fontRef>
+        </p:style>
+        <p:txBody>
+          <a:bodyPr rtlCol="0" anchor="ctr"/>
+          <a:lstStyle/>
+          <a:p>
+            <a:pPr algn="ctr"/>
+            <a:r>
+              <a:rPr lang="en-US" dirty="0"/>
+              <a:t>triangles</a:t>
+            </a:r>
+            <a:endParaRPr lang="en-CA" dirty="0"/>
+          </a:p>
+        </p:txBody>
+      </p:sp>
+      <p:sp>
+        <p:nvSpPr>
+          <p:cNvPr id="12" name="Arrow: Right 11">
+            <a:extLst>
+              <a:ext uri="{FF2B5EF4-FFF2-40B4-BE49-F238E27FC236}">
+                <a16:creationId xmlns:a16="http://schemas.microsoft.com/office/drawing/2014/main" id="{8BA75D60-E7CE-C3FE-3BD0-217A41FA36C5}"/>
+              </a:ext>
+            </a:extLst>
+          </p:cNvPr>
+          <p:cNvSpPr/>
+          <p:nvPr/>
+        </p:nvSpPr>
+        <p:spPr>
+          <a:xfrm>
+            <a:off x="3347864" y="1707654"/>
+            <a:ext cx="1440160" cy="504056"/>
+          </a:xfrm>
+          <a:prstGeom prst="rightArrow">
+            <a:avLst/>
+          </a:prstGeom>
+        </p:spPr>
+        <p:style>
+          <a:lnRef idx="2">
+            <a:schemeClr val="accent1">
+              <a:shade val="15000"/>
+            </a:schemeClr>
+          </a:lnRef>
+          <a:fillRef idx="1">
+            <a:schemeClr val="accent1"/>
+          </a:fillRef>
+          <a:effectRef idx="0">
+            <a:schemeClr val="accent1"/>
+          </a:effectRef>
+          <a:fontRef idx="minor">
+            <a:schemeClr val="lt1"/>
+          </a:fontRef>
+        </p:style>
+        <p:txBody>
+          <a:bodyPr rtlCol="0" anchor="ctr"/>
+          <a:lstStyle/>
+          <a:p>
+            <a:pPr algn="ctr"/>
+            <a:endParaRPr lang="en-CA"/>
+          </a:p>
+        </p:txBody>
+      </p:sp>
+      <p:sp>
+        <p:nvSpPr>
+          <p:cNvPr id="13" name="Rectangle: Rounded Corners 12">
+            <a:extLst>
+              <a:ext uri="{FF2B5EF4-FFF2-40B4-BE49-F238E27FC236}">
+                <a16:creationId xmlns:a16="http://schemas.microsoft.com/office/drawing/2014/main" id="{1650158B-88B0-6AD9-6C93-865DE48543E0}"/>
+              </a:ext>
+            </a:extLst>
+          </p:cNvPr>
+          <p:cNvSpPr/>
+          <p:nvPr/>
+        </p:nvSpPr>
+        <p:spPr>
+          <a:xfrm>
+            <a:off x="4773156" y="2570232"/>
+            <a:ext cx="3119420" cy="720080"/>
+          </a:xfrm>
+          <a:prstGeom prst="roundRect">
+            <a:avLst/>
+          </a:prstGeom>
+          <a:solidFill>
+            <a:schemeClr val="accent3"/>
+          </a:solidFill>
+          <a:ln>
+            <a:noFill/>
+          </a:ln>
+        </p:spPr>
+        <p:style>
+          <a:lnRef idx="0">
+            <a:scrgbClr r="0" g="0" b="0"/>
+          </a:lnRef>
+          <a:fillRef idx="0">
+            <a:scrgbClr r="0" g="0" b="0"/>
+          </a:fillRef>
+          <a:effectRef idx="0">
+            <a:scrgbClr r="0" g="0" b="0"/>
+          </a:effectRef>
+          <a:fontRef idx="minor">
+            <a:schemeClr val="lt1"/>
+          </a:fontRef>
+        </p:style>
+        <p:txBody>
+          <a:bodyPr rtlCol="0" anchor="ctr"/>
+          <a:lstStyle/>
+          <a:p>
+            <a:pPr algn="ctr"/>
+            <a:r>
+              <a:rPr lang="en-US" dirty="0"/>
+              <a:t>Element buffer</a:t>
+            </a:r>
+            <a:endParaRPr lang="en-CA" dirty="0"/>
+          </a:p>
+        </p:txBody>
+      </p:sp>
+      <p:sp>
+        <p:nvSpPr>
+          <p:cNvPr id="14" name="Arrow: Right 13">
+            <a:extLst>
+              <a:ext uri="{FF2B5EF4-FFF2-40B4-BE49-F238E27FC236}">
+                <a16:creationId xmlns:a16="http://schemas.microsoft.com/office/drawing/2014/main" id="{E9A06E9E-3073-D564-C8D3-528D829D0016}"/>
+              </a:ext>
+            </a:extLst>
+          </p:cNvPr>
+          <p:cNvSpPr/>
+          <p:nvPr/>
+        </p:nvSpPr>
+        <p:spPr>
+          <a:xfrm>
+            <a:off x="3242614" y="2672970"/>
+            <a:ext cx="1440160" cy="504056"/>
+          </a:xfrm>
+          <a:prstGeom prst="rightArrow">
+            <a:avLst/>
+          </a:prstGeom>
+        </p:spPr>
+        <p:style>
+          <a:lnRef idx="2">
+            <a:schemeClr val="accent1">
+              <a:shade val="15000"/>
+            </a:schemeClr>
+          </a:lnRef>
+          <a:fillRef idx="1">
+            <a:schemeClr val="accent1"/>
+          </a:fillRef>
+          <a:effectRef idx="0">
+            <a:schemeClr val="accent1"/>
+          </a:effectRef>
+          <a:fontRef idx="minor">
+            <a:schemeClr val="lt1"/>
+          </a:fontRef>
+        </p:style>
+        <p:txBody>
+          <a:bodyPr rtlCol="0" anchor="ctr"/>
+          <a:lstStyle/>
+          <a:p>
+            <a:pPr algn="ctr"/>
+            <a:endParaRPr lang="en-CA"/>
+          </a:p>
+        </p:txBody>
+      </p:sp>
+    </p:spTree>
+    <p:extLst>
+      <p:ext uri="{BB962C8B-B14F-4D97-AF65-F5344CB8AC3E}">
+        <p14:creationId xmlns:p14="http://schemas.microsoft.com/office/powerpoint/2010/main" val="3782305140"/>
+      </p:ext>
+    </p:extLst>
+  </p:cSld>
+  <p:clrMapOvr>
+    <a:masterClrMapping/>
+  </p:clrMapOvr>
+</p:sld>
+</file>
+
+<file path=ppt/slides/slide7.xml><?xml version="1.0" encoding="utf-8"?>
+<p:sld xmlns:a="http://schemas.openxmlformats.org/drawingml/2006/main" xmlns:r="http://schemas.openxmlformats.org/officeDocument/2006/relationships" xmlns:p="http://schemas.openxmlformats.org/presentationml/2006/main">
+  <p:cSld>
+    <p:spTree>
+      <p:nvGrpSpPr>
+        <p:cNvPr id="1" name=""/>
+        <p:cNvGrpSpPr/>
+        <p:nvPr/>
+      </p:nvGrpSpPr>
+      <p:grpSpPr>
+        <a:xfrm>
+          <a:off x="0" y="0"/>
+          <a:ext cx="0" cy="0"/>
+          <a:chOff x="0" y="0"/>
+          <a:chExt cx="0" cy="0"/>
+        </a:xfrm>
+      </p:grpSpPr>
+      <p:sp>
+        <p:nvSpPr>
           <p:cNvPr id="5" name="Rectangle: Rounded Corners 4">
             <a:extLst>
               <a:ext uri="{FF2B5EF4-FFF2-40B4-BE49-F238E27FC236}">
@@ -6732,7 +7163,7 @@
 </p:sld>
 </file>
 
-<file path=ppt/slides/slide7.xml><?xml version="1.0" encoding="utf-8"?>
+<file path=ppt/slides/slide8.xml><?xml version="1.0" encoding="utf-8"?>
 <p:sld xmlns:a="http://schemas.openxmlformats.org/drawingml/2006/main" xmlns:r="http://schemas.openxmlformats.org/officeDocument/2006/relationships" xmlns:p="http://schemas.openxmlformats.org/presentationml/2006/main">
   <p:cSld>
     <p:spTree>

</xml_diff>